<commit_message>
added effect on elastic modulus
</commit_message>
<xml_diff>
--- a/temperature_effect_on_flow_curves.pptx
+++ b/temperature_effect_on_flow_curves.pptx
@@ -13,6 +13,7 @@
     <p:sldId id="281" r:id="rId7"/>
     <p:sldId id="285" r:id="rId8"/>
     <p:sldId id="286" r:id="rId9"/>
+    <p:sldId id="287" r:id="rId10"/>
   </p:sldIdLst>
   <p:sldSz cx="12192000" cy="6858000"/>
   <p:notesSz cx="6858000" cy="9144000"/>
@@ -111,6 +112,11 @@
       </a:defRPr>
     </a:lvl9pPr>
   </p:defaultTextStyle>
+  <p:extLst>
+    <p:ext uri="{EFAFB233-063F-42B5-8137-9DF3F51BA10A}">
+      <p15:sldGuideLst xmlns:p15="http://schemas.microsoft.com/office/powerpoint/2012/main"/>
+    </p:ext>
+  </p:extLst>
 </p:presentation>
 </file>
 
@@ -263,7 +269,7 @@
           <a:p>
             <a:fld id="{8279156B-F1B5-4B94-B518-32885F5D996E}" type="datetimeFigureOut">
               <a:rPr lang="en-US" smtClean="0"/>
-              <a:t>2/2/2022</a:t>
+              <a:t>2/3/2022</a:t>
             </a:fld>
             <a:endParaRPr lang="en-US"/>
           </a:p>
@@ -463,7 +469,7 @@
           <a:p>
             <a:fld id="{8279156B-F1B5-4B94-B518-32885F5D996E}" type="datetimeFigureOut">
               <a:rPr lang="en-US" smtClean="0"/>
-              <a:t>2/2/2022</a:t>
+              <a:t>2/3/2022</a:t>
             </a:fld>
             <a:endParaRPr lang="en-US"/>
           </a:p>
@@ -673,7 +679,7 @@
           <a:p>
             <a:fld id="{8279156B-F1B5-4B94-B518-32885F5D996E}" type="datetimeFigureOut">
               <a:rPr lang="en-US" smtClean="0"/>
-              <a:t>2/2/2022</a:t>
+              <a:t>2/3/2022</a:t>
             </a:fld>
             <a:endParaRPr lang="en-US"/>
           </a:p>
@@ -873,7 +879,7 @@
           <a:p>
             <a:fld id="{8279156B-F1B5-4B94-B518-32885F5D996E}" type="datetimeFigureOut">
               <a:rPr lang="en-US" smtClean="0"/>
-              <a:t>2/2/2022</a:t>
+              <a:t>2/3/2022</a:t>
             </a:fld>
             <a:endParaRPr lang="en-US"/>
           </a:p>
@@ -1149,7 +1155,7 @@
           <a:p>
             <a:fld id="{8279156B-F1B5-4B94-B518-32885F5D996E}" type="datetimeFigureOut">
               <a:rPr lang="en-US" smtClean="0"/>
-              <a:t>2/2/2022</a:t>
+              <a:t>2/3/2022</a:t>
             </a:fld>
             <a:endParaRPr lang="en-US"/>
           </a:p>
@@ -1417,7 +1423,7 @@
           <a:p>
             <a:fld id="{8279156B-F1B5-4B94-B518-32885F5D996E}" type="datetimeFigureOut">
               <a:rPr lang="en-US" smtClean="0"/>
-              <a:t>2/2/2022</a:t>
+              <a:t>2/3/2022</a:t>
             </a:fld>
             <a:endParaRPr lang="en-US"/>
           </a:p>
@@ -1832,7 +1838,7 @@
           <a:p>
             <a:fld id="{8279156B-F1B5-4B94-B518-32885F5D996E}" type="datetimeFigureOut">
               <a:rPr lang="en-US" smtClean="0"/>
-              <a:t>2/2/2022</a:t>
+              <a:t>2/3/2022</a:t>
             </a:fld>
             <a:endParaRPr lang="en-US"/>
           </a:p>
@@ -1974,7 +1980,7 @@
           <a:p>
             <a:fld id="{8279156B-F1B5-4B94-B518-32885F5D996E}" type="datetimeFigureOut">
               <a:rPr lang="en-US" smtClean="0"/>
-              <a:t>2/2/2022</a:t>
+              <a:t>2/3/2022</a:t>
             </a:fld>
             <a:endParaRPr lang="en-US"/>
           </a:p>
@@ -2087,7 +2093,7 @@
           <a:p>
             <a:fld id="{8279156B-F1B5-4B94-B518-32885F5D996E}" type="datetimeFigureOut">
               <a:rPr lang="en-US" smtClean="0"/>
-              <a:t>2/2/2022</a:t>
+              <a:t>2/3/2022</a:t>
             </a:fld>
             <a:endParaRPr lang="en-US"/>
           </a:p>
@@ -2400,7 +2406,7 @@
           <a:p>
             <a:fld id="{8279156B-F1B5-4B94-B518-32885F5D996E}" type="datetimeFigureOut">
               <a:rPr lang="en-US" smtClean="0"/>
-              <a:t>2/2/2022</a:t>
+              <a:t>2/3/2022</a:t>
             </a:fld>
             <a:endParaRPr lang="en-US"/>
           </a:p>
@@ -2689,7 +2695,7 @@
           <a:p>
             <a:fld id="{8279156B-F1B5-4B94-B518-32885F5D996E}" type="datetimeFigureOut">
               <a:rPr lang="en-US" smtClean="0"/>
-              <a:t>2/2/2022</a:t>
+              <a:t>2/3/2022</a:t>
             </a:fld>
             <a:endParaRPr lang="en-US"/>
           </a:p>
@@ -2932,7 +2938,7 @@
           <a:p>
             <a:fld id="{8279156B-F1B5-4B94-B518-32885F5D996E}" type="datetimeFigureOut">
               <a:rPr lang="en-US" smtClean="0"/>
-              <a:t>2/2/2022</a:t>
+              <a:t>2/3/2022</a:t>
             </a:fld>
             <a:endParaRPr lang="en-US"/>
           </a:p>
@@ -6853,6 +6859,172 @@
 </p:sld>
 </file>
 
+<file path=ppt/slides/slide9.xml><?xml version="1.0" encoding="utf-8"?>
+<p:sld xmlns:a="http://schemas.openxmlformats.org/drawingml/2006/main" xmlns:r="http://schemas.openxmlformats.org/officeDocument/2006/relationships" xmlns:p="http://schemas.openxmlformats.org/presentationml/2006/main">
+  <p:cSld>
+    <p:spTree>
+      <p:nvGrpSpPr>
+        <p:cNvPr id="1" name=""/>
+        <p:cNvGrpSpPr/>
+        <p:nvPr/>
+      </p:nvGrpSpPr>
+      <p:grpSpPr>
+        <a:xfrm>
+          <a:off x="0" y="0"/>
+          <a:ext cx="0" cy="0"/>
+          <a:chOff x="0" y="0"/>
+          <a:chExt cx="0" cy="0"/>
+        </a:xfrm>
+      </p:grpSpPr>
+      <p:sp>
+        <p:nvSpPr>
+          <p:cNvPr id="4" name="Title 1">
+            <a:extLst>
+              <a:ext uri="{FF2B5EF4-FFF2-40B4-BE49-F238E27FC236}">
+                <a16:creationId xmlns:a16="http://schemas.microsoft.com/office/drawing/2014/main" id="{AE5322DC-9B9C-4FA6-A67A-B268C1AD69EC}"/>
+              </a:ext>
+            </a:extLst>
+          </p:cNvPr>
+          <p:cNvSpPr>
+            <a:spLocks noGrp="1"/>
+          </p:cNvSpPr>
+          <p:nvPr>
+            <p:ph type="title"/>
+          </p:nvPr>
+        </p:nvSpPr>
+        <p:spPr>
+          <a:xfrm>
+            <a:off x="66832" y="147894"/>
+            <a:ext cx="10515600" cy="1325563"/>
+          </a:xfrm>
+        </p:spPr>
+        <p:txBody>
+          <a:bodyPr/>
+          <a:lstStyle/>
+          <a:p>
+            <a:r>
+              <a:rPr lang="fr-CH" dirty="0" err="1"/>
+              <a:t>Temperature</a:t>
+            </a:r>
+            <a:r>
+              <a:rPr lang="fr-CH" dirty="0"/>
+              <a:t> </a:t>
+            </a:r>
+            <a:r>
+              <a:rPr lang="fr-CH" dirty="0" err="1"/>
+              <a:t>effect</a:t>
+            </a:r>
+            <a:br>
+              <a:rPr lang="fr-CH" dirty="0"/>
+            </a:br>
+            <a:r>
+              <a:rPr lang="fr-CH" sz="2800" dirty="0"/>
+              <a:t>on </a:t>
+            </a:r>
+            <a:r>
+              <a:rPr lang="fr-CH" sz="2800" dirty="0" err="1"/>
+              <a:t>elastic</a:t>
+            </a:r>
+            <a:r>
+              <a:rPr lang="fr-CH" sz="2800" dirty="0"/>
+              <a:t> </a:t>
+            </a:r>
+            <a:r>
+              <a:rPr lang="fr-CH" sz="2800" dirty="0" err="1"/>
+              <a:t>modulus</a:t>
+            </a:r>
+            <a:endParaRPr lang="en-US" dirty="0"/>
+          </a:p>
+        </p:txBody>
+      </p:sp>
+      <p:pic>
+        <p:nvPicPr>
+          <p:cNvPr id="6" name="Image 5">
+            <a:extLst>
+              <a:ext uri="{FF2B5EF4-FFF2-40B4-BE49-F238E27FC236}">
+                <a16:creationId xmlns:a16="http://schemas.microsoft.com/office/drawing/2014/main" id="{729ACF1C-1064-4A10-A137-6CA53EB7096B}"/>
+              </a:ext>
+            </a:extLst>
+          </p:cNvPr>
+          <p:cNvPicPr>
+            <a:picLocks noChangeAspect="1"/>
+          </p:cNvPicPr>
+          <p:nvPr/>
+        </p:nvPicPr>
+        <p:blipFill>
+          <a:blip r:embed="rId2">
+            <a:extLst>
+              <a:ext uri="{28A0092B-C50C-407E-A947-70E740481C1C}">
+                <a14:useLocalDpi xmlns:a14="http://schemas.microsoft.com/office/drawing/2010/main" val="0"/>
+              </a:ext>
+            </a:extLst>
+          </a:blip>
+          <a:stretch>
+            <a:fillRect/>
+          </a:stretch>
+        </p:blipFill>
+        <p:spPr>
+          <a:xfrm>
+            <a:off x="509117" y="1611518"/>
+            <a:ext cx="7603251" cy="2816358"/>
+          </a:xfrm>
+          <a:prstGeom prst="rect">
+            <a:avLst/>
+          </a:prstGeom>
+        </p:spPr>
+      </p:pic>
+      <p:sp>
+        <p:nvSpPr>
+          <p:cNvPr id="7" name="ZoneTexte 6">
+            <a:extLst>
+              <a:ext uri="{FF2B5EF4-FFF2-40B4-BE49-F238E27FC236}">
+                <a16:creationId xmlns:a16="http://schemas.microsoft.com/office/drawing/2014/main" id="{709BDA64-C9E0-45A6-B095-DC47A532D739}"/>
+              </a:ext>
+            </a:extLst>
+          </p:cNvPr>
+          <p:cNvSpPr txBox="1"/>
+          <p:nvPr/>
+        </p:nvSpPr>
+        <p:spPr>
+          <a:xfrm>
+            <a:off x="1053737" y="4604693"/>
+            <a:ext cx="3001399" cy="369332"/>
+          </a:xfrm>
+          <a:prstGeom prst="rect">
+            <a:avLst/>
+          </a:prstGeom>
+          <a:noFill/>
+        </p:spPr>
+        <p:txBody>
+          <a:bodyPr wrap="none" rtlCol="0">
+            <a:spAutoFit/>
+          </a:bodyPr>
+          <a:lstStyle/>
+          <a:p>
+            <a:r>
+              <a:rPr lang="en-US" dirty="0">
+                <a:latin typeface="Linux Biolinum" panose="02000503000000000000" pitchFamily="2" charset="0"/>
+                <a:ea typeface="Linux Biolinum" panose="02000503000000000000" pitchFamily="2" charset="0"/>
+                <a:cs typeface="Linux Biolinum" panose="02000503000000000000" pitchFamily="2" charset="0"/>
+              </a:rPr>
+              <a:t>small effect, unclear tendency</a:t>
+            </a:r>
+          </a:p>
+        </p:txBody>
+      </p:sp>
+    </p:spTree>
+    <p:extLst>
+      <p:ext uri="{BB962C8B-B14F-4D97-AF65-F5344CB8AC3E}">
+        <p14:creationId xmlns:p14="http://schemas.microsoft.com/office/powerpoint/2010/main" val="1246131274"/>
+      </p:ext>
+    </p:extLst>
+  </p:cSld>
+  <p:clrMapOvr>
+    <a:masterClrMapping/>
+  </p:clrMapOvr>
+</p:sld>
+</file>
+
 <file path=ppt/theme/theme1.xml><?xml version="1.0" encoding="utf-8"?>
 <a:theme xmlns:a="http://schemas.openxmlformats.org/drawingml/2006/main" name="Thème Office">
   <a:themeElements>

</xml_diff>